<commit_message>
Update NYC Airbnb Analysis Presentation .pptx
</commit_message>
<xml_diff>
--- a/NYC Airbnb Analysis Presentation .pptx
+++ b/NYC Airbnb Analysis Presentation .pptx
@@ -870,7 +870,7 @@
           <a:p>
             <a:r>
               <a:rPr lang="en-US" dirty="0"/>
-              <a:t>The aim of this analysis is to answer the following questions: </a:t>
+              <a:t>The aim of our project’s analysis is to answer the following questions: </a:t>
             </a:r>
           </a:p>
           <a:p>
@@ -939,7 +939,7 @@
             </a:pPr>
             <a:r>
               <a:rPr lang="en-US" sz="1200" dirty="0"/>
-              <a:t>Do these property type availability vary by neighbourhood?</a:t>
+              <a:t>Does property type availability vary by neighbourhood?</a:t>
             </a:r>
           </a:p>
           <a:p>
@@ -5255,7 +5255,7 @@
               <a:rPr lang="en-US" sz="3600" dirty="0">
                 <a:latin typeface="+mj-lt"/>
               </a:rPr>
-              <a:t>Exploratory Data Analysis and Visualization of New York City Airbnb Properties</a:t>
+              <a:t>Exploratory Data Analysis and Visualization of New York City Airbnb Listings – 02/11/21</a:t>
             </a:r>
             <a:endParaRPr lang="en-US" dirty="0"/>
           </a:p>
@@ -5304,7 +5304,7 @@
         <p:spPr>
           <a:xfrm>
             <a:off x="4411824" y="5276184"/>
-            <a:ext cx="7938674" cy="923330"/>
+            <a:ext cx="7938674" cy="1200329"/>
           </a:xfrm>
           <a:prstGeom prst="rect">
             <a:avLst/>
@@ -5341,6 +5341,9 @@
               <a:rPr lang="en-US" i="1" dirty="0" err="1"/>
               <a:t>Beachey</a:t>
             </a:r>
+            <a:endParaRPr lang="en-US" i="1" dirty="0"/>
+          </a:p>
+          <a:p>
             <a:endParaRPr lang="en-US" i="1" dirty="0"/>
           </a:p>
           <a:p>
@@ -6321,7 +6324,7 @@
         <p:spPr>
           <a:xfrm>
             <a:off x="67387" y="1328803"/>
-            <a:ext cx="12057225" cy="5847755"/>
+            <a:ext cx="12057225" cy="5416868"/>
           </a:xfrm>
           <a:prstGeom prst="rect">
             <a:avLst/>
@@ -6393,7 +6396,7 @@
               <a:rPr lang="en-US" sz="2800" dirty="0">
                 <a:latin typeface="+mj-lt"/>
               </a:rPr>
-              <a:t>New York City (NYC) is one of the most visited tourist attractions in the world, a major center of the entertainment industry, and the world’s leading financial center. </a:t>
+              <a:t>New York City (NYC) is one of the most visited tourist attractions globally, a major center of the entertainment industry, and the world’s leading financial center. </a:t>
             </a:r>
           </a:p>
           <a:p>

</xml_diff>